<commit_message>
Ajusta requisitaos não funcionais
</commit_message>
<xml_diff>
--- a/Enunciado e modelos/Orientação e Modelo para a Apresentação para a Banca/Apresentacao_projeto_arquitetural_TCC.pptx
+++ b/Enunciado e modelos/Orientação e Modelo para a Apresentação para a Banca/Apresentacao_projeto_arquitetural_TCC.pptx
@@ -2377,7 +2377,7 @@
                 </a:solidFill>
                 <a:latin typeface="Calibri" pitchFamily="34" charset="0"/>
               </a:rPr>
-              <a:t>Cenário 1: Interoperabilidade</a:t>
+              <a:t>Cenário 1: Usabilidade</a:t>
             </a:r>
           </a:p>
           <a:p>
@@ -2403,7 +2403,7 @@
                 </a:solidFill>
                 <a:latin typeface="Calibri" pitchFamily="34" charset="0"/>
               </a:rPr>
-              <a:t>Cenário 2: Usabilidade</a:t>
+              <a:t>Cenário 2: Acessibilidade</a:t>
             </a:r>
           </a:p>
           <a:p>
@@ -2429,8 +2429,29 @@
                 </a:solidFill>
                 <a:latin typeface="Calibri" pitchFamily="34" charset="0"/>
               </a:rPr>
-              <a:t>Cenário 3: Acessibilidade</a:t>
-            </a:r>
+              <a:t>Cenário 3: </a:t>
+            </a:r>
+            <a:r>
+              <a:rPr lang="pt-BR" sz="2300" b="1" dirty="0" err="1" smtClean="0">
+                <a:solidFill>
+                  <a:schemeClr val="tx1">
+                    <a:lumMod val="75000"/>
+                    <a:lumOff val="25000"/>
+                  </a:schemeClr>
+                </a:solidFill>
+                <a:latin typeface="Calibri" pitchFamily="34" charset="0"/>
+              </a:rPr>
+              <a:t>Manutenibilidade</a:t>
+            </a:r>
+            <a:endParaRPr lang="pt-BR" sz="2300" b="1" dirty="0" smtClean="0">
+              <a:solidFill>
+                <a:schemeClr val="tx1">
+                  <a:lumMod val="75000"/>
+                  <a:lumOff val="25000"/>
+                </a:schemeClr>
+              </a:solidFill>
+              <a:latin typeface="Calibri" pitchFamily="34" charset="0"/>
+            </a:endParaRPr>
           </a:p>
           <a:p>
             <a:pPr>
@@ -2455,10 +2476,10 @@
                 </a:solidFill>
                 <a:latin typeface="Calibri" pitchFamily="34" charset="0"/>
               </a:rPr>
-              <a:t>Cenário 4: </a:t>
-            </a:r>
-            <a:r>
-              <a:rPr lang="pt-BR" sz="2300" b="1" dirty="0" err="1" smtClean="0">
+              <a:t>Cenário 4</a:t>
+            </a:r>
+            <a:r>
+              <a:rPr lang="pt-BR" sz="2300" b="1" smtClean="0">
                 <a:solidFill>
                   <a:schemeClr val="tx1">
                     <a:lumMod val="75000"/>
@@ -2467,7 +2488,7 @@
                 </a:solidFill>
                 <a:latin typeface="Calibri" pitchFamily="34" charset="0"/>
               </a:rPr>
-              <a:t>Manutenibilidade</a:t>
+              <a:t>: Disponibilidade</a:t>
             </a:r>
             <a:endParaRPr lang="pt-BR" sz="2300" b="1" dirty="0" smtClean="0">
               <a:solidFill>
@@ -3864,7 +3885,7 @@
                 </a:solidFill>
                 <a:latin typeface="Calibri" pitchFamily="34" charset="0"/>
               </a:rPr>
-              <a:t> automatização </a:t>
+              <a:t> automatização d</a:t>
             </a:r>
             <a:r>
               <a:rPr lang="pt-BR" sz="2300" b="1" dirty="0" smtClean="0">
@@ -5212,7 +5233,7 @@
               <a:defRPr/>
             </a:pPr>
             <a:r>
-              <a:rPr lang="pt-BR" sz="2300" b="1" dirty="0" err="1" smtClean="0">
+              <a:rPr lang="pt-BR" sz="2300" b="1" dirty="0" smtClean="0">
                 <a:solidFill>
                   <a:schemeClr val="tx1">
                     <a:lumMod val="75000"/>
@@ -5221,17 +5242,8 @@
                 </a:solidFill>
                 <a:latin typeface="Calibri" pitchFamily="34" charset="0"/>
               </a:rPr>
-              <a:t>Usabildade</a:t>
-            </a:r>
-            <a:endParaRPr lang="pt-BR" sz="2300" b="1" dirty="0" smtClean="0">
-              <a:solidFill>
-                <a:schemeClr val="tx1">
-                  <a:lumMod val="75000"/>
-                  <a:lumOff val="25000"/>
-                </a:schemeClr>
-              </a:solidFill>
-              <a:latin typeface="Calibri" pitchFamily="34" charset="0"/>
-            </a:endParaRPr>
+              <a:t>O sistema deve prover boa experiência do usuário (UX)</a:t>
+            </a:r>
           </a:p>
           <a:p>
             <a:pPr marL="342900" indent="-342900">
@@ -5258,7 +5270,7 @@
                 </a:solidFill>
                 <a:latin typeface="Calibri" pitchFamily="34" charset="0"/>
               </a:rPr>
-              <a:t>Acessibilidade</a:t>
+              <a:t>O sistema deve ser responsivo (Web e Mobile)</a:t>
             </a:r>
           </a:p>
           <a:p>
@@ -5286,7 +5298,7 @@
                 </a:solidFill>
                 <a:latin typeface="Calibri" pitchFamily="34" charset="0"/>
               </a:rPr>
-              <a:t>Desempenho</a:t>
+              <a:t>O sistema deve ser rápido</a:t>
             </a:r>
           </a:p>
           <a:p>
@@ -5305,7 +5317,7 @@
               <a:defRPr/>
             </a:pPr>
             <a:r>
-              <a:rPr lang="pt-BR" sz="2300" b="1" dirty="0" err="1" smtClean="0">
+              <a:rPr lang="pt-BR" sz="2300" b="1" dirty="0" smtClean="0">
                 <a:solidFill>
                   <a:schemeClr val="tx1">
                     <a:lumMod val="75000"/>
@@ -5314,17 +5326,8 @@
                 </a:solidFill>
                 <a:latin typeface="Calibri" pitchFamily="34" charset="0"/>
               </a:rPr>
-              <a:t>Manutenibilidade</a:t>
-            </a:r>
-            <a:endParaRPr lang="pt-BR" sz="2300" b="1" dirty="0" smtClean="0">
-              <a:solidFill>
-                <a:schemeClr val="tx1">
-                  <a:lumMod val="75000"/>
-                  <a:lumOff val="25000"/>
-                </a:schemeClr>
-              </a:solidFill>
-              <a:latin typeface="Calibri" pitchFamily="34" charset="0"/>
-            </a:endParaRPr>
+              <a:t>O sistema deve prover manutenção facilitada</a:t>
+            </a:r>
           </a:p>
           <a:p>
             <a:pPr marL="342900" indent="-342900">
@@ -5342,7 +5345,7 @@
               <a:defRPr/>
             </a:pPr>
             <a:r>
-              <a:rPr lang="pt-BR" sz="2300" b="1" dirty="0" err="1" smtClean="0">
+              <a:rPr lang="pt-BR" sz="2300" b="1" dirty="0" smtClean="0">
                 <a:solidFill>
                   <a:schemeClr val="tx1">
                     <a:lumMod val="75000"/>
@@ -5351,17 +5354,8 @@
                 </a:solidFill>
                 <a:latin typeface="Calibri" pitchFamily="34" charset="0"/>
               </a:rPr>
-              <a:t>Testabilidade</a:t>
-            </a:r>
-            <a:endParaRPr lang="pt-BR" sz="2300" b="1" dirty="0" smtClean="0">
-              <a:solidFill>
-                <a:schemeClr val="tx1">
-                  <a:lumMod val="75000"/>
-                  <a:lumOff val="25000"/>
-                </a:schemeClr>
-              </a:solidFill>
-              <a:latin typeface="Calibri" pitchFamily="34" charset="0"/>
-            </a:endParaRPr>
+              <a:t>O sistema deve ser simples de testar</a:t>
+            </a:r>
           </a:p>
           <a:p>
             <a:pPr marL="342900" indent="-342900">
@@ -5388,7 +5382,7 @@
                 </a:solidFill>
                 <a:latin typeface="Calibri" pitchFamily="34" charset="0"/>
               </a:rPr>
-              <a:t>Interoperabilidade</a:t>
+              <a:t>O sistema deve ser comunicar com outros sistemas</a:t>
             </a:r>
           </a:p>
           <a:p>
@@ -5416,7 +5410,7 @@
                 </a:solidFill>
                 <a:latin typeface="Calibri" pitchFamily="34" charset="0"/>
               </a:rPr>
-              <a:t>Disponibilidade</a:t>
+              <a:t>O sistema deve operar 24/7</a:t>
             </a:r>
           </a:p>
           <a:p>
@@ -5444,7 +5438,7 @@
                 </a:solidFill>
                 <a:latin typeface="Calibri" pitchFamily="34" charset="0"/>
               </a:rPr>
-              <a:t>Segurança</a:t>
+              <a:t>O sistema deve apresentar altos padrões de segurança</a:t>
             </a:r>
             <a:endParaRPr lang="pt-BR" sz="2300" b="1" dirty="0" smtClean="0">
               <a:solidFill>
@@ -7067,7 +7061,7 @@
           <p:nvPr>
             <p:extLst>
               <p:ext uri="{D42A27DB-BD31-4B8C-83A1-F6EECF244321}">
-                <p14:modId xmlns:p14="http://schemas.microsoft.com/office/powerpoint/2010/main" val="864963390"/>
+                <p14:modId xmlns:p14="http://schemas.microsoft.com/office/powerpoint/2010/main" val="2685502042"/>
               </p:ext>
             </p:extLst>
           </p:nvPr>
@@ -7493,12 +7487,18 @@
                         </a:spcAft>
                       </a:pPr>
                       <a:r>
-                        <a:rPr lang="pt-BR" sz="1100">
+                        <a:rPr lang="pt-BR" sz="1100" dirty="0" err="1">
                           <a:effectLst/>
                         </a:rPr>
-                        <a:t>Mule </a:t>
+                        <a:t>Mule</a:t>
                       </a:r>
-                      <a:endParaRPr lang="pt-BR" sz="1100">
+                      <a:r>
+                        <a:rPr lang="pt-BR" sz="1100" dirty="0">
+                          <a:effectLst/>
+                        </a:rPr>
+                        <a:t> </a:t>
+                      </a:r>
+                      <a:endParaRPr lang="pt-BR" sz="1100" dirty="0">
                         <a:solidFill>
                           <a:srgbClr val="000000"/>
                         </a:solidFill>
@@ -7591,12 +7591,12 @@
                         </a:spcAft>
                       </a:pPr>
                       <a:r>
-                        <a:rPr lang="pt-BR" sz="1100">
+                        <a:rPr lang="pt-BR" sz="1100" dirty="0">
                           <a:effectLst/>
                         </a:rPr>
                         <a:t>log4J</a:t>
                       </a:r>
-                      <a:endParaRPr lang="pt-BR" sz="1100">
+                      <a:endParaRPr lang="pt-BR" sz="1100" dirty="0">
                         <a:solidFill>
                           <a:srgbClr val="000000"/>
                         </a:solidFill>
@@ -7689,12 +7689,12 @@
                         </a:spcAft>
                       </a:pPr>
                       <a:r>
-                        <a:rPr lang="pt-BR" sz="1100">
+                        <a:rPr lang="pt-BR" sz="1100" dirty="0">
                           <a:effectLst/>
                         </a:rPr>
                         <a:t>Redis </a:t>
                       </a:r>
-                      <a:endParaRPr lang="pt-BR" sz="1100">
+                      <a:endParaRPr lang="pt-BR" sz="1100" dirty="0">
                         <a:solidFill>
                           <a:srgbClr val="000000"/>
                         </a:solidFill>
@@ -7897,12 +7897,18 @@
                         </a:spcAft>
                       </a:pPr>
                       <a:r>
-                        <a:rPr lang="pt-BR" sz="1100">
+                        <a:rPr lang="pt-BR" sz="1100" dirty="0" err="1">
                           <a:effectLst/>
                         </a:rPr>
-                        <a:t>Jenkins </a:t>
+                        <a:t>Jenkins</a:t>
                       </a:r>
-                      <a:endParaRPr lang="pt-BR" sz="1100">
+                      <a:r>
+                        <a:rPr lang="pt-BR" sz="1100" dirty="0">
+                          <a:effectLst/>
+                        </a:rPr>
+                        <a:t> </a:t>
+                      </a:r>
+                      <a:endParaRPr lang="pt-BR" sz="1100" dirty="0">
                         <a:solidFill>
                           <a:srgbClr val="000000"/>
                         </a:solidFill>
@@ -8215,12 +8221,24 @@
                         </a:spcAft>
                       </a:pPr>
                       <a:r>
-                        <a:rPr lang="pt-BR" sz="1100">
+                        <a:rPr lang="pt-BR" sz="1100" dirty="0" err="1">
                           <a:effectLst/>
                         </a:rPr>
-                        <a:t>OAuth </a:t>
+                        <a:t>OAuth</a:t>
                       </a:r>
-                      <a:endParaRPr lang="pt-BR" sz="1100">
+                      <a:r>
+                        <a:rPr lang="pt-BR" sz="1100" dirty="0">
+                          <a:effectLst/>
+                        </a:rPr>
+                        <a:t> </a:t>
+                      </a:r>
+                      <a:r>
+                        <a:rPr lang="pt-BR" sz="1100" dirty="0" smtClean="0">
+                          <a:effectLst/>
+                        </a:rPr>
+                        <a:t>2</a:t>
+                      </a:r>
+                      <a:endParaRPr lang="pt-BR" sz="1100" dirty="0">
                         <a:solidFill>
                           <a:srgbClr val="000000"/>
                         </a:solidFill>
@@ -8411,12 +8429,12 @@
                         </a:spcAft>
                       </a:pPr>
                       <a:r>
-                        <a:rPr lang="pt-BR" sz="1100">
+                        <a:rPr lang="pt-BR" sz="1100" dirty="0" err="1" smtClean="0">
                           <a:effectLst/>
                         </a:rPr>
-                        <a:t>NGINX </a:t>
+                        <a:t>Eureka</a:t>
                       </a:r>
-                      <a:endParaRPr lang="pt-BR" sz="1100">
+                      <a:endParaRPr lang="pt-BR" sz="1100" dirty="0">
                         <a:solidFill>
                           <a:srgbClr val="000000"/>
                         </a:solidFill>

</xml_diff>